<commit_message>
Submittted Nothing in it
</commit_message>
<xml_diff>
--- a/GradutionProject/App_Data/答辩PPT.pptx
+++ b/GradutionProject/App_Data/答辩PPT.pptx
@@ -5,7 +5,7 @@
     <p:sldMasterId id="2147483648" r:id="rId1"/>
   </p:sldMasterIdLst>
   <p:notesMasterIdLst>
-    <p:notesMasterId r:id="rId14"/>
+    <p:notesMasterId r:id="rId17"/>
   </p:notesMasterIdLst>
   <p:sldIdLst>
     <p:sldId id="256" r:id="rId2"/>
@@ -14,12 +14,15 @@
     <p:sldId id="267" r:id="rId5"/>
     <p:sldId id="259" r:id="rId6"/>
     <p:sldId id="262" r:id="rId7"/>
-    <p:sldId id="263" r:id="rId8"/>
-    <p:sldId id="264" r:id="rId9"/>
-    <p:sldId id="260" r:id="rId10"/>
-    <p:sldId id="261" r:id="rId11"/>
-    <p:sldId id="268" r:id="rId12"/>
-    <p:sldId id="269" r:id="rId13"/>
+    <p:sldId id="264" r:id="rId8"/>
+    <p:sldId id="260" r:id="rId9"/>
+    <p:sldId id="261" r:id="rId10"/>
+    <p:sldId id="268" r:id="rId11"/>
+    <p:sldId id="269" r:id="rId12"/>
+    <p:sldId id="270" r:id="rId13"/>
+    <p:sldId id="271" r:id="rId14"/>
+    <p:sldId id="272" r:id="rId15"/>
+    <p:sldId id="273" r:id="rId16"/>
   </p:sldIdLst>
   <p:sldSz cx="12192000" cy="6858000"/>
   <p:notesSz cx="6858000" cy="9144000"/>
@@ -3531,7 +3534,7 @@
       </p:grpSpPr>
       <p:sp>
         <p:nvSpPr>
-          <p:cNvPr id="2" name="标题 1"/>
+          <p:cNvPr id="2" name="Title 1"/>
           <p:cNvSpPr>
             <a:spLocks noGrp="1"/>
           </p:cNvSpPr>
@@ -3544,13 +3547,25 @@
           <a:bodyPr/>
           <a:lstStyle/>
           <a:p>
-            <a:endParaRPr lang="zh-CN" altLang="en-US" dirty="0"/>
-          </a:p>
-        </p:txBody>
-      </p:sp>
-      <p:sp>
-        <p:nvSpPr>
-          <p:cNvPr id="3" name="内容占位符 2"/>
+            <a:r>
+              <a:rPr lang="zh-CN" altLang="en-US" dirty="0"/>
+              <a:t>教师首页（</a:t>
+            </a:r>
+            <a:r>
+              <a:rPr lang="en-US" altLang="zh-CN" dirty="0"/>
+              <a:t>TeacherMainPage</a:t>
+            </a:r>
+            <a:r>
+              <a:rPr lang="zh-CN" altLang="en-US" dirty="0"/>
+              <a:t>）</a:t>
+            </a:r>
+            <a:endParaRPr lang="en-US" dirty="0"/>
+          </a:p>
+        </p:txBody>
+      </p:sp>
+      <p:sp>
+        <p:nvSpPr>
+          <p:cNvPr id="3" name="Content Placeholder 2"/>
           <p:cNvSpPr>
             <a:spLocks noGrp="1"/>
           </p:cNvSpPr>
@@ -3565,25 +3580,32 @@
           <a:p>
             <a:r>
               <a:rPr lang="zh-CN" altLang="en-US" dirty="0"/>
-              <a:t>占位</a:t>
-            </a:r>
+              <a:t>查看本周所有课程</a:t>
+            </a:r>
+            <a:endParaRPr lang="en-US" altLang="zh-CN" dirty="0"/>
           </a:p>
           <a:p>
             <a:r>
               <a:rPr lang="zh-CN" altLang="en-US" dirty="0"/>
-              <a:t>占位：</a:t>
-            </a:r>
-            <a:r>
-              <a:rPr lang="zh-CN" altLang="en-US" dirty="0">
-                <a:hlinkClick r:id="rId2" action="ppaction://hlinkfile"/>
-              </a:rPr>
-              <a:t>学生选课系统数据库设计</a:t>
-            </a:r>
-            <a:endParaRPr lang="zh-CN" altLang="en-US" dirty="0"/>
+              <a:t>查看本学期所有课程</a:t>
+            </a:r>
+            <a:endParaRPr lang="en-US" altLang="zh-CN" dirty="0"/>
+          </a:p>
+          <a:p>
+            <a:r>
+              <a:rPr lang="zh-CN" altLang="en-US" dirty="0"/>
+              <a:t>查看所有课程及学生相关信息</a:t>
+            </a:r>
+            <a:endParaRPr lang="en-US" dirty="0"/>
           </a:p>
         </p:txBody>
       </p:sp>
     </p:spTree>
+    <p:extLst>
+      <p:ext uri="{BB962C8B-B14F-4D97-AF65-F5344CB8AC3E}">
+        <p14:creationId xmlns:p14="http://schemas.microsoft.com/office/powerpoint/2010/main" val="626948549"/>
+      </p:ext>
+    </p:extLst>
   </p:cSld>
   <p:clrMapOvr>
     <a:masterClrMapping/>
@@ -3625,11 +3647,11 @@
           <a:p>
             <a:r>
               <a:rPr lang="zh-CN" altLang="en-US" dirty="0"/>
-              <a:t>教师首页（</a:t>
+              <a:t>学生首页（</a:t>
             </a:r>
             <a:r>
               <a:rPr lang="en-US" altLang="zh-CN" dirty="0"/>
-              <a:t>TeacherMainPage</a:t>
+              <a:t>StudentMainPage</a:t>
             </a:r>
             <a:r>
               <a:rPr lang="zh-CN" altLang="en-US" dirty="0"/>
@@ -3656,30 +3678,42 @@
           <a:p>
             <a:r>
               <a:rPr lang="zh-CN" altLang="en-US" dirty="0"/>
-              <a:t>查看本周所有课程</a:t>
+              <a:t>我的课表（显示当前工作日的课表，以</a:t>
+            </a:r>
+            <a:r>
+              <a:rPr lang="en-US" altLang="zh-CN" dirty="0"/>
+              <a:t>List</a:t>
+            </a:r>
+            <a:r>
+              <a:rPr lang="zh-CN" altLang="en-US" dirty="0"/>
+              <a:t>形式，周末的时候显示下周一的课表，也可以显示全部课表）</a:t>
             </a:r>
             <a:endParaRPr lang="en-US" altLang="zh-CN" dirty="0"/>
           </a:p>
           <a:p>
             <a:r>
               <a:rPr lang="zh-CN" altLang="en-US" dirty="0"/>
-              <a:t>查看本学期所有课程</a:t>
+              <a:t>我的课程（显示所有课程）</a:t>
             </a:r>
             <a:endParaRPr lang="en-US" altLang="zh-CN" dirty="0"/>
           </a:p>
           <a:p>
             <a:r>
+              <a:rPr lang="zh-CN" altLang="en-US"/>
+              <a:t>展</a:t>
+            </a:r>
+            <a:r>
               <a:rPr lang="zh-CN" altLang="en-US" dirty="0"/>
-              <a:t>查看所有课程及学生相关信息</a:t>
-            </a:r>
-            <a:endParaRPr lang="en-US" dirty="0"/>
+              <a:t>示所有课程时，将学生已经选的课程标记出来防止重复提交选课。</a:t>
+            </a:r>
+            <a:endParaRPr lang="en-US" altLang="zh-CN" dirty="0"/>
           </a:p>
         </p:txBody>
       </p:sp>
     </p:spTree>
     <p:extLst>
       <p:ext uri="{BB962C8B-B14F-4D97-AF65-F5344CB8AC3E}">
-        <p14:creationId xmlns:p14="http://schemas.microsoft.com/office/powerpoint/2010/main" val="626948549"/>
+        <p14:creationId xmlns:p14="http://schemas.microsoft.com/office/powerpoint/2010/main" val="1080529251"/>
       </p:ext>
     </p:extLst>
   </p:cSld>
@@ -3722,16 +3756,8 @@
           <a:lstStyle/>
           <a:p>
             <a:r>
-              <a:rPr lang="zh-CN" altLang="en-US" dirty="0"/>
-              <a:t>学生首页（</a:t>
-            </a:r>
-            <a:r>
               <a:rPr lang="en-US" altLang="zh-CN" dirty="0"/>
-              <a:t>StudentMainPage</a:t>
-            </a:r>
-            <a:r>
-              <a:rPr lang="zh-CN" altLang="en-US" dirty="0"/>
-              <a:t>）</a:t>
+              <a:t>ASP.NET</a:t>
             </a:r>
             <a:endParaRPr lang="en-US" dirty="0"/>
           </a:p>
@@ -3753,61 +3779,261 @@
           <a:lstStyle/>
           <a:p>
             <a:r>
-              <a:rPr lang="zh-CN" altLang="en-US" dirty="0"/>
-              <a:t>我的课表（显示当前工作日的课表，以</a:t>
-            </a:r>
-            <a:r>
-              <a:rPr lang="en-US" altLang="zh-CN" dirty="0"/>
-              <a:t>List</a:t>
-            </a:r>
-            <a:r>
-              <a:rPr lang="zh-CN" altLang="en-US" dirty="0"/>
-              <a:t>形式，周末的时候显示下周一的课表，也可以显示全部课表）</a:t>
-            </a:r>
-            <a:endParaRPr lang="en-US" altLang="zh-CN" dirty="0"/>
-          </a:p>
-          <a:p>
-            <a:r>
-              <a:rPr lang="zh-CN" altLang="en-US" dirty="0"/>
-              <a:t>我的课程（显示所有课程）</a:t>
-            </a:r>
-            <a:endParaRPr lang="en-US" altLang="zh-CN" dirty="0"/>
-          </a:p>
-          <a:p>
-            <a:r>
-              <a:rPr lang="zh-CN" altLang="en-US" dirty="0"/>
-              <a:t>与我有关的老师（）</a:t>
-            </a:r>
-            <a:endParaRPr lang="en-US" altLang="zh-CN" dirty="0"/>
-          </a:p>
-          <a:p>
-            <a:r>
-              <a:rPr lang="zh-CN" altLang="en-US" dirty="0"/>
-              <a:t>与我有关的同学（）</a:t>
-            </a:r>
-            <a:endParaRPr lang="en-US" altLang="zh-CN" dirty="0"/>
-          </a:p>
-          <a:p>
-            <a:r>
-              <a:rPr lang="zh-CN" altLang="en-US" dirty="0"/>
-              <a:t>展示所有课程时</a:t>
-            </a:r>
-            <a:r>
-              <a:rPr lang="zh-CN" altLang="en-US"/>
-              <a:t>，将学</a:t>
-            </a:r>
-            <a:r>
-              <a:rPr lang="zh-CN" altLang="en-US" dirty="0"/>
-              <a:t>生已经选的课程标记出来防止重复提交选课。</a:t>
-            </a:r>
-            <a:endParaRPr lang="en-US" altLang="zh-CN" dirty="0"/>
+              <a:rPr lang="en-US" altLang="zh-CN" dirty="0" err="1"/>
+              <a:t>Misrosoft</a:t>
+            </a:r>
+            <a:endParaRPr lang="en-US" dirty="0"/>
           </a:p>
         </p:txBody>
       </p:sp>
     </p:spTree>
     <p:extLst>
       <p:ext uri="{BB962C8B-B14F-4D97-AF65-F5344CB8AC3E}">
-        <p14:creationId xmlns:p14="http://schemas.microsoft.com/office/powerpoint/2010/main" val="1080529251"/>
+        <p14:creationId xmlns:p14="http://schemas.microsoft.com/office/powerpoint/2010/main" val="3021528895"/>
+      </p:ext>
+    </p:extLst>
+  </p:cSld>
+  <p:clrMapOvr>
+    <a:masterClrMapping/>
+  </p:clrMapOvr>
+</p:sld>
+</file>
+
+<file path=ppt/slides/slide13.xml><?xml version="1.0" encoding="utf-8"?>
+<p:sld xmlns:a="http://schemas.openxmlformats.org/drawingml/2006/main" xmlns:r="http://schemas.openxmlformats.org/officeDocument/2006/relationships" xmlns:p="http://schemas.openxmlformats.org/presentationml/2006/main">
+  <p:cSld>
+    <p:spTree>
+      <p:nvGrpSpPr>
+        <p:cNvPr id="1" name=""/>
+        <p:cNvGrpSpPr/>
+        <p:nvPr/>
+      </p:nvGrpSpPr>
+      <p:grpSpPr>
+        <a:xfrm>
+          <a:off x="0" y="0"/>
+          <a:ext cx="0" cy="0"/>
+          <a:chOff x="0" y="0"/>
+          <a:chExt cx="0" cy="0"/>
+        </a:xfrm>
+      </p:grpSpPr>
+      <p:sp>
+        <p:nvSpPr>
+          <p:cNvPr id="2" name="Title 1"/>
+          <p:cNvSpPr>
+            <a:spLocks noGrp="1"/>
+          </p:cNvSpPr>
+          <p:nvPr>
+            <p:ph type="title"/>
+          </p:nvPr>
+        </p:nvSpPr>
+        <p:spPr/>
+        <p:txBody>
+          <a:bodyPr/>
+          <a:lstStyle/>
+          <a:p>
+            <a:r>
+              <a:rPr lang="en-US" altLang="zh-CN" dirty="0"/>
+              <a:t>Ajax</a:t>
+            </a:r>
+            <a:endParaRPr lang="en-US" dirty="0"/>
+          </a:p>
+        </p:txBody>
+      </p:sp>
+      <p:sp>
+        <p:nvSpPr>
+          <p:cNvPr id="3" name="Content Placeholder 2"/>
+          <p:cNvSpPr>
+            <a:spLocks noGrp="1"/>
+          </p:cNvSpPr>
+          <p:nvPr>
+            <p:ph idx="1"/>
+          </p:nvPr>
+        </p:nvSpPr>
+        <p:spPr/>
+        <p:txBody>
+          <a:bodyPr/>
+          <a:lstStyle/>
+          <a:p>
+            <a:r>
+              <a:rPr lang="en-US" altLang="zh-CN" dirty="0" err="1"/>
+              <a:t>Javascript</a:t>
+            </a:r>
+            <a:endParaRPr lang="en-US" dirty="0"/>
+          </a:p>
+        </p:txBody>
+      </p:sp>
+    </p:spTree>
+    <p:extLst>
+      <p:ext uri="{BB962C8B-B14F-4D97-AF65-F5344CB8AC3E}">
+        <p14:creationId xmlns:p14="http://schemas.microsoft.com/office/powerpoint/2010/main" val="3569135567"/>
+      </p:ext>
+    </p:extLst>
+  </p:cSld>
+  <p:clrMapOvr>
+    <a:masterClrMapping/>
+  </p:clrMapOvr>
+</p:sld>
+</file>
+
+<file path=ppt/slides/slide14.xml><?xml version="1.0" encoding="utf-8"?>
+<p:sld xmlns:a="http://schemas.openxmlformats.org/drawingml/2006/main" xmlns:r="http://schemas.openxmlformats.org/officeDocument/2006/relationships" xmlns:p="http://schemas.openxmlformats.org/presentationml/2006/main">
+  <p:cSld>
+    <p:spTree>
+      <p:nvGrpSpPr>
+        <p:cNvPr id="1" name=""/>
+        <p:cNvGrpSpPr/>
+        <p:nvPr/>
+      </p:nvGrpSpPr>
+      <p:grpSpPr>
+        <a:xfrm>
+          <a:off x="0" y="0"/>
+          <a:ext cx="0" cy="0"/>
+          <a:chOff x="0" y="0"/>
+          <a:chExt cx="0" cy="0"/>
+        </a:xfrm>
+      </p:grpSpPr>
+      <p:sp>
+        <p:nvSpPr>
+          <p:cNvPr id="2" name="Title 1"/>
+          <p:cNvSpPr>
+            <a:spLocks noGrp="1"/>
+          </p:cNvSpPr>
+          <p:nvPr>
+            <p:ph type="title"/>
+          </p:nvPr>
+        </p:nvSpPr>
+        <p:spPr/>
+        <p:txBody>
+          <a:bodyPr/>
+          <a:lstStyle/>
+          <a:p>
+            <a:r>
+              <a:rPr lang="en-US" altLang="zh-CN" dirty="0"/>
+              <a:t>Bootstrap</a:t>
+            </a:r>
+            <a:endParaRPr lang="en-US" dirty="0"/>
+          </a:p>
+        </p:txBody>
+      </p:sp>
+      <p:sp>
+        <p:nvSpPr>
+          <p:cNvPr id="3" name="Content Placeholder 2"/>
+          <p:cNvSpPr>
+            <a:spLocks noGrp="1"/>
+          </p:cNvSpPr>
+          <p:nvPr>
+            <p:ph idx="1"/>
+          </p:nvPr>
+        </p:nvSpPr>
+        <p:spPr/>
+        <p:txBody>
+          <a:bodyPr/>
+          <a:lstStyle/>
+          <a:p>
+            <a:r>
+              <a:rPr lang="zh-CN" altLang="en-US" dirty="0"/>
+              <a:t>栅格系统</a:t>
+            </a:r>
+            <a:endParaRPr lang="en-US" dirty="0"/>
+          </a:p>
+        </p:txBody>
+      </p:sp>
+    </p:spTree>
+    <p:extLst>
+      <p:ext uri="{BB962C8B-B14F-4D97-AF65-F5344CB8AC3E}">
+        <p14:creationId xmlns:p14="http://schemas.microsoft.com/office/powerpoint/2010/main" val="3863618792"/>
+      </p:ext>
+    </p:extLst>
+  </p:cSld>
+  <p:clrMapOvr>
+    <a:masterClrMapping/>
+  </p:clrMapOvr>
+</p:sld>
+</file>
+
+<file path=ppt/slides/slide15.xml><?xml version="1.0" encoding="utf-8"?>
+<p:sld xmlns:a="http://schemas.openxmlformats.org/drawingml/2006/main" xmlns:r="http://schemas.openxmlformats.org/officeDocument/2006/relationships" xmlns:p="http://schemas.openxmlformats.org/presentationml/2006/main">
+  <p:cSld>
+    <p:spTree>
+      <p:nvGrpSpPr>
+        <p:cNvPr id="1" name=""/>
+        <p:cNvGrpSpPr/>
+        <p:nvPr/>
+      </p:nvGrpSpPr>
+      <p:grpSpPr>
+        <a:xfrm>
+          <a:off x="0" y="0"/>
+          <a:ext cx="0" cy="0"/>
+          <a:chOff x="0" y="0"/>
+          <a:chExt cx="0" cy="0"/>
+        </a:xfrm>
+      </p:grpSpPr>
+      <p:sp>
+        <p:nvSpPr>
+          <p:cNvPr id="2" name="Title 1"/>
+          <p:cNvSpPr>
+            <a:spLocks noGrp="1"/>
+          </p:cNvSpPr>
+          <p:nvPr>
+            <p:ph type="title"/>
+          </p:nvPr>
+        </p:nvSpPr>
+        <p:spPr/>
+        <p:txBody>
+          <a:bodyPr/>
+          <a:lstStyle/>
+          <a:p>
+            <a:endParaRPr lang="en-US"/>
+          </a:p>
+        </p:txBody>
+      </p:sp>
+      <p:sp>
+        <p:nvSpPr>
+          <p:cNvPr id="3" name="Content Placeholder 2"/>
+          <p:cNvSpPr>
+            <a:spLocks noGrp="1"/>
+          </p:cNvSpPr>
+          <p:nvPr>
+            <p:ph idx="1"/>
+          </p:nvPr>
+        </p:nvSpPr>
+        <p:spPr/>
+        <p:txBody>
+          <a:bodyPr/>
+          <a:lstStyle/>
+          <a:p>
+            <a:endParaRPr lang="en-US"/>
+          </a:p>
+        </p:txBody>
+      </p:sp>
+      <p:pic>
+        <p:nvPicPr>
+          <p:cNvPr id="4" name="Picture 3"/>
+          <p:cNvPicPr>
+            <a:picLocks noChangeAspect="1"/>
+          </p:cNvPicPr>
+          <p:nvPr/>
+        </p:nvPicPr>
+        <p:blipFill>
+          <a:blip r:embed="rId2"/>
+          <a:stretch>
+            <a:fillRect/>
+          </a:stretch>
+        </p:blipFill>
+        <p:spPr>
+          <a:xfrm>
+            <a:off x="1583392" y="0"/>
+            <a:ext cx="9025215" cy="6858000"/>
+          </a:xfrm>
+          <a:prstGeom prst="rect">
+            <a:avLst/>
+          </a:prstGeom>
+        </p:spPr>
+      </p:pic>
+    </p:spTree>
+    <p:extLst>
+      <p:ext uri="{BB962C8B-B14F-4D97-AF65-F5344CB8AC3E}">
+        <p14:creationId xmlns:p14="http://schemas.microsoft.com/office/powerpoint/2010/main" val="1750666264"/>
       </p:ext>
     </p:extLst>
   </p:cSld>
@@ -3906,7 +4132,7 @@
               <a:buChar char=""/>
             </a:pPr>
             <a:r>
-              <a:rPr lang="zh-CN" altLang="en-US" sz="2000">
+              <a:rPr lang="zh-CN" altLang="en-US" sz="2000" dirty="0">
                 <a:sym typeface="+mn-ea"/>
               </a:rPr>
               <a:t>作为注册用户，或者预备注册用户，他们拥有选课的权限；</a:t>
@@ -3918,7 +4144,7 @@
               <a:buChar char=""/>
             </a:pPr>
             <a:r>
-              <a:rPr lang="zh-CN" altLang="en-US" sz="2000">
+              <a:rPr lang="zh-CN" altLang="en-US" sz="2000" dirty="0">
                 <a:sym typeface="+mn-ea"/>
               </a:rPr>
               <a:t>作为游客，只能浏览所有课程、查看相关信息，而不能进行选课；</a:t>
@@ -3930,7 +4156,7 @@
               <a:buChar char=""/>
             </a:pPr>
             <a:r>
-              <a:rPr lang="zh-CN" altLang="en-US" sz="2000">
+              <a:rPr lang="zh-CN" altLang="en-US" sz="2000" dirty="0">
                 <a:sym typeface="+mn-ea"/>
               </a:rPr>
               <a:t>用户相关的数据库表：</a:t>
@@ -3942,7 +4168,7 @@
               <a:buNone/>
             </a:pPr>
             <a:r>
-              <a:rPr lang="zh-CN" altLang="en-US" sz="1800">
+              <a:rPr lang="zh-CN" altLang="en-US" sz="1800" dirty="0">
                 <a:solidFill>
                   <a:srgbClr val="00B050"/>
                 </a:solidFill>
@@ -3951,7 +4177,7 @@
               <a:t>登录验证表（</a:t>
             </a:r>
             <a:r>
-              <a:rPr lang="en-US" altLang="zh-CN" sz="1800">
+              <a:rPr lang="en-US" altLang="zh-CN" sz="1800" dirty="0" err="1">
                 <a:solidFill>
                   <a:srgbClr val="00B050"/>
                 </a:solidFill>
@@ -3960,7 +4186,7 @@
               <a:t>login_examine</a:t>
             </a:r>
             <a:r>
-              <a:rPr lang="zh-CN" altLang="en-US" sz="1800">
+              <a:rPr lang="zh-CN" altLang="en-US" sz="1800" dirty="0">
                 <a:solidFill>
                   <a:srgbClr val="00B050"/>
                 </a:solidFill>
@@ -3975,67 +4201,73 @@
               <a:buNone/>
             </a:pPr>
             <a:r>
-              <a:rPr lang="zh-CN" altLang="en-US" sz="1200" b="1">
+              <a:rPr lang="zh-CN" altLang="en-US" sz="1200" b="1" dirty="0">
                 <a:sym typeface="+mn-ea"/>
               </a:rPr>
               <a:t>唯一编号（</a:t>
             </a:r>
             <a:r>
-              <a:rPr lang="en-US" altLang="zh-CN" sz="1200" b="1">
+              <a:rPr lang="en-US" altLang="zh-CN" sz="1200" b="1" dirty="0">
                 <a:sym typeface="+mn-ea"/>
               </a:rPr>
               <a:t>uniqueClientID</a:t>
             </a:r>
             <a:r>
-              <a:rPr lang="zh-CN" altLang="en-US" sz="1200" b="1">
+              <a:rPr lang="zh-CN" altLang="en-US" sz="1200" b="1" dirty="0">
                 <a:sym typeface="+mn-ea"/>
               </a:rPr>
               <a:t>）、用户名（</a:t>
             </a:r>
             <a:r>
-              <a:rPr lang="en-US" altLang="zh-CN" sz="1200" b="1">
+              <a:rPr lang="en-US" altLang="zh-CN" sz="1200" b="1" dirty="0">
                 <a:sym typeface="+mn-ea"/>
               </a:rPr>
               <a:t>username</a:t>
             </a:r>
             <a:r>
-              <a:rPr lang="zh-CN" altLang="en-US" sz="1200" b="1">
+              <a:rPr lang="zh-CN" altLang="en-US" sz="1200" b="1" dirty="0">
                 <a:sym typeface="+mn-ea"/>
               </a:rPr>
               <a:t>）、密码（</a:t>
             </a:r>
             <a:r>
-              <a:rPr lang="en-US" altLang="zh-CN" sz="1200" b="1">
+              <a:rPr lang="en-US" altLang="zh-CN" sz="1200" b="1" dirty="0">
                 <a:sym typeface="+mn-ea"/>
               </a:rPr>
               <a:t>password</a:t>
             </a:r>
             <a:r>
-              <a:rPr lang="zh-CN" altLang="en-US" sz="1200" b="1">
+              <a:rPr lang="zh-CN" altLang="en-US" sz="1200" b="1" dirty="0">
                 <a:sym typeface="+mn-ea"/>
               </a:rPr>
               <a:t>）、注册日期（</a:t>
             </a:r>
             <a:r>
-              <a:rPr lang="en-US" altLang="zh-CN" sz="1200" b="1">
+              <a:rPr lang="en-US" altLang="zh-CN" sz="1200" b="1" dirty="0" err="1">
                 <a:sym typeface="+mn-ea"/>
               </a:rPr>
               <a:t>registryDate</a:t>
             </a:r>
             <a:r>
-              <a:rPr lang="zh-CN" altLang="en-US" sz="1200" b="1">
+              <a:rPr lang="zh-CN" altLang="en-US" sz="1200" b="1" dirty="0">
                 <a:sym typeface="+mn-ea"/>
               </a:rPr>
               <a:t>）、注册类型（</a:t>
             </a:r>
             <a:r>
-              <a:rPr lang="en-US" altLang="zh-CN" sz="1200" b="1">
-                <a:sym typeface="+mn-ea"/>
-              </a:rPr>
-              <a:t>registryType: student/teacher</a:t>
-            </a:r>
-            <a:r>
-              <a:rPr lang="zh-CN" altLang="en-US" sz="1200" b="1">
+              <a:rPr lang="en-US" altLang="zh-CN" sz="1200" b="1" dirty="0" err="1">
+                <a:sym typeface="+mn-ea"/>
+              </a:rPr>
+              <a:t>registryType</a:t>
+            </a:r>
+            <a:r>
+              <a:rPr lang="en-US" altLang="zh-CN" sz="1200" b="1" dirty="0">
+                <a:sym typeface="+mn-ea"/>
+              </a:rPr>
+              <a:t>: student/teacher</a:t>
+            </a:r>
+            <a:r>
+              <a:rPr lang="zh-CN" altLang="en-US" sz="1200" b="1" dirty="0">
                 <a:sym typeface="+mn-ea"/>
               </a:rPr>
               <a:t>）</a:t>
@@ -4047,7 +4279,7 @@
               <a:buNone/>
             </a:pPr>
             <a:r>
-              <a:rPr lang="zh-CN" altLang="en-US" sz="1800">
+              <a:rPr lang="zh-CN" altLang="en-US" sz="1800" dirty="0">
                 <a:solidFill>
                   <a:srgbClr val="00B050"/>
                 </a:solidFill>
@@ -4056,7 +4288,7 @@
               <a:t>学生信息表（</a:t>
             </a:r>
             <a:r>
-              <a:rPr lang="en-US" altLang="zh-CN" sz="1800">
+              <a:rPr lang="en-US" altLang="zh-CN" sz="1800" dirty="0" err="1">
                 <a:solidFill>
                   <a:srgbClr val="00B050"/>
                 </a:solidFill>
@@ -4065,7 +4297,7 @@
               <a:t>student_information</a:t>
             </a:r>
             <a:r>
-              <a:rPr lang="zh-CN" altLang="en-US" sz="1800">
+              <a:rPr lang="zh-CN" altLang="en-US" sz="1800" dirty="0">
                 <a:solidFill>
                   <a:srgbClr val="00B050"/>
                 </a:solidFill>
@@ -4080,145 +4312,145 @@
               <a:buNone/>
             </a:pPr>
             <a:r>
-              <a:rPr lang="zh-CN" altLang="en-US" sz="1200" b="1">
+              <a:rPr lang="zh-CN" altLang="en-US" sz="1200" b="1" dirty="0">
                 <a:sym typeface="+mn-ea"/>
               </a:rPr>
               <a:t>唯一编号（</a:t>
             </a:r>
             <a:r>
-              <a:rPr lang="en-US" altLang="zh-CN" sz="1200" b="1">
+              <a:rPr lang="en-US" altLang="zh-CN" sz="1200" b="1" dirty="0">
                 <a:sym typeface="+mn-ea"/>
               </a:rPr>
               <a:t>uniqueClientID</a:t>
             </a:r>
             <a:r>
-              <a:rPr lang="zh-CN" altLang="en-US" sz="1200" b="1">
+              <a:rPr lang="zh-CN" altLang="en-US" sz="1200" b="1" dirty="0">
                 <a:sym typeface="+mn-ea"/>
               </a:rPr>
               <a:t>）、姓名（</a:t>
             </a:r>
             <a:r>
-              <a:rPr lang="en-US" altLang="zh-CN" sz="1200" b="1">
+              <a:rPr lang="en-US" altLang="zh-CN" sz="1200" b="1" dirty="0">
                 <a:sym typeface="+mn-ea"/>
               </a:rPr>
               <a:t>name</a:t>
             </a:r>
             <a:r>
-              <a:rPr lang="zh-CN" altLang="en-US" sz="1200" b="1">
+              <a:rPr lang="zh-CN" altLang="en-US" sz="1200" b="1" dirty="0">
                 <a:sym typeface="+mn-ea"/>
               </a:rPr>
               <a:t>）、性别（</a:t>
             </a:r>
             <a:r>
-              <a:rPr lang="en-US" altLang="zh-CN" sz="1200" b="1">
+              <a:rPr lang="en-US" altLang="zh-CN" sz="1200" b="1" dirty="0">
                 <a:sym typeface="+mn-ea"/>
               </a:rPr>
               <a:t>gender</a:t>
             </a:r>
             <a:r>
-              <a:rPr lang="zh-CN" altLang="en-US" sz="1200" b="1">
+              <a:rPr lang="zh-CN" altLang="en-US" sz="1200" b="1" dirty="0">
                 <a:sym typeface="+mn-ea"/>
               </a:rPr>
               <a:t>）、年龄（</a:t>
             </a:r>
             <a:r>
-              <a:rPr lang="en-US" altLang="zh-CN" sz="1200" b="1">
+              <a:rPr lang="en-US" altLang="zh-CN" sz="1200" b="1" dirty="0">
                 <a:sym typeface="+mn-ea"/>
               </a:rPr>
               <a:t>age</a:t>
             </a:r>
             <a:r>
-              <a:rPr lang="zh-CN" altLang="en-US" sz="1200" b="1">
+              <a:rPr lang="zh-CN" altLang="en-US" sz="1200" b="1" dirty="0">
                 <a:sym typeface="+mn-ea"/>
               </a:rPr>
               <a:t>）、邮箱（</a:t>
             </a:r>
             <a:r>
-              <a:rPr lang="en-US" altLang="zh-CN" sz="1200" b="1">
+              <a:rPr lang="en-US" altLang="zh-CN" sz="1200" b="1" dirty="0">
                 <a:sym typeface="+mn-ea"/>
               </a:rPr>
               <a:t>email</a:t>
             </a:r>
             <a:r>
-              <a:rPr lang="zh-CN" altLang="en-US" sz="1200" b="1">
+              <a:rPr lang="zh-CN" altLang="en-US" sz="1200" b="1" dirty="0">
                 <a:sym typeface="+mn-ea"/>
               </a:rPr>
               <a:t>）、微信（</a:t>
             </a:r>
             <a:r>
-              <a:rPr lang="en-US" altLang="zh-CN" sz="1200" b="1">
+              <a:rPr lang="en-US" altLang="zh-CN" sz="1200" b="1" dirty="0">
                 <a:sym typeface="+mn-ea"/>
               </a:rPr>
               <a:t>wechat</a:t>
             </a:r>
             <a:r>
-              <a:rPr lang="zh-CN" altLang="en-US" sz="1200" b="1">
+              <a:rPr lang="zh-CN" altLang="en-US" sz="1200" b="1" dirty="0">
                 <a:sym typeface="+mn-ea"/>
               </a:rPr>
               <a:t>）、</a:t>
             </a:r>
             <a:r>
-              <a:rPr lang="en-US" altLang="zh-CN" sz="1200" b="1">
+              <a:rPr lang="en-US" altLang="zh-CN" sz="1200" b="1" dirty="0">
                 <a:sym typeface="+mn-ea"/>
               </a:rPr>
               <a:t>QQ</a:t>
             </a:r>
             <a:r>
-              <a:rPr lang="zh-CN" altLang="en-US" sz="1200" b="1">
+              <a:rPr lang="zh-CN" altLang="en-US" sz="1200" b="1" dirty="0">
                 <a:sym typeface="+mn-ea"/>
               </a:rPr>
               <a:t>号（</a:t>
             </a:r>
             <a:r>
-              <a:rPr lang="en-US" altLang="zh-CN" sz="1200" b="1">
+              <a:rPr lang="en-US" altLang="zh-CN" sz="1200" b="1" dirty="0" err="1">
                 <a:sym typeface="+mn-ea"/>
               </a:rPr>
               <a:t>qqNumber</a:t>
             </a:r>
             <a:r>
-              <a:rPr lang="zh-CN" altLang="en-US" sz="1200" b="1">
+              <a:rPr lang="zh-CN" altLang="en-US" sz="1200" b="1" dirty="0">
                 <a:sym typeface="+mn-ea"/>
               </a:rPr>
               <a:t>）、手机号（</a:t>
             </a:r>
             <a:r>
-              <a:rPr lang="en-US" altLang="zh-CN" sz="1200" b="1">
+              <a:rPr lang="en-US" altLang="zh-CN" sz="1200" b="1" dirty="0">
                 <a:sym typeface="+mn-ea"/>
               </a:rPr>
               <a:t>phone</a:t>
             </a:r>
             <a:r>
-              <a:rPr lang="zh-CN" altLang="en-US" sz="1200" b="1">
+              <a:rPr lang="zh-CN" altLang="en-US" sz="1200" b="1" dirty="0">
                 <a:sym typeface="+mn-ea"/>
               </a:rPr>
               <a:t>）、学校（</a:t>
             </a:r>
             <a:r>
-              <a:rPr lang="en-US" altLang="zh-CN" sz="1200" b="1">
+              <a:rPr lang="en-US" altLang="zh-CN" sz="1200" b="1" dirty="0">
                 <a:sym typeface="+mn-ea"/>
               </a:rPr>
               <a:t>university</a:t>
             </a:r>
             <a:r>
-              <a:rPr lang="zh-CN" altLang="en-US" sz="1200" b="1">
+              <a:rPr lang="zh-CN" altLang="en-US" sz="1200" b="1" dirty="0">
                 <a:sym typeface="+mn-ea"/>
               </a:rPr>
               <a:t>）、学院（</a:t>
             </a:r>
             <a:r>
-              <a:rPr lang="en-US" altLang="zh-CN" sz="1200" b="1">
+              <a:rPr lang="en-US" altLang="zh-CN" sz="1200" b="1" dirty="0">
                 <a:sym typeface="+mn-ea"/>
               </a:rPr>
               <a:t>college</a:t>
             </a:r>
             <a:r>
-              <a:rPr lang="zh-CN" altLang="en-US" sz="1200" b="1">
+              <a:rPr lang="zh-CN" altLang="en-US" sz="1200" b="1" dirty="0">
                 <a:sym typeface="+mn-ea"/>
               </a:rPr>
               <a:t>）</a:t>
             </a:r>
             <a:r>
-              <a:rPr lang="zh-CN" altLang="en-US" sz="1200" b="1">
+              <a:rPr lang="zh-CN" altLang="en-US" sz="1200" b="1" dirty="0">
                 <a:solidFill>
                   <a:schemeClr val="tx1"/>
                 </a:solidFill>
@@ -4227,7 +4459,7 @@
               <a:t>、专业（</a:t>
             </a:r>
             <a:r>
-              <a:rPr lang="en-US" altLang="zh-CN" sz="1200" b="1">
+              <a:rPr lang="en-US" altLang="zh-CN" sz="1200" b="1" dirty="0">
                 <a:solidFill>
                   <a:schemeClr val="tx1"/>
                 </a:solidFill>
@@ -4236,7 +4468,7 @@
               <a:t>major</a:t>
             </a:r>
             <a:r>
-              <a:rPr lang="zh-CN" altLang="en-US" sz="1200" b="1">
+              <a:rPr lang="zh-CN" altLang="en-US" sz="1200" b="1" dirty="0">
                 <a:solidFill>
                   <a:schemeClr val="tx1"/>
                 </a:solidFill>
@@ -4245,7 +4477,7 @@
               <a:t>）、年级（</a:t>
             </a:r>
             <a:r>
-              <a:rPr lang="en-US" altLang="zh-CN" sz="1200" b="1">
+              <a:rPr lang="en-US" altLang="zh-CN" sz="1200" b="1" dirty="0">
                 <a:solidFill>
                   <a:schemeClr val="tx1"/>
                 </a:solidFill>
@@ -4254,7 +4486,7 @@
               <a:t>grade</a:t>
             </a:r>
             <a:r>
-              <a:rPr lang="zh-CN" altLang="en-US" sz="1200" b="1">
+              <a:rPr lang="zh-CN" altLang="en-US" sz="1200" b="1" dirty="0">
                 <a:solidFill>
                   <a:schemeClr val="tx1"/>
                 </a:solidFill>
@@ -4263,7 +4495,7 @@
               <a:t>）、学生学号（</a:t>
             </a:r>
             <a:r>
-              <a:rPr lang="en-US" altLang="zh-CN" sz="1200" b="1">
+              <a:rPr lang="en-US" altLang="zh-CN" sz="1200" b="1" dirty="0" err="1">
                 <a:solidFill>
                   <a:schemeClr val="tx1"/>
                 </a:solidFill>
@@ -4272,7 +4504,7 @@
               <a:t>cardNo</a:t>
             </a:r>
             <a:r>
-              <a:rPr lang="zh-CN" altLang="en-US" sz="1200" b="1">
+              <a:rPr lang="zh-CN" altLang="en-US" sz="1200" b="1" dirty="0">
                 <a:solidFill>
                   <a:schemeClr val="tx1"/>
                 </a:solidFill>
@@ -4281,7 +4513,7 @@
               <a:t>）、学号密码（</a:t>
             </a:r>
             <a:r>
-              <a:rPr lang="en-US" altLang="zh-CN" sz="1200" b="1">
+              <a:rPr lang="en-US" altLang="zh-CN" sz="1200" b="1" dirty="0" err="1">
                 <a:solidFill>
                   <a:schemeClr val="tx1"/>
                 </a:solidFill>
@@ -4290,7 +4522,7 @@
               <a:t>cardPass</a:t>
             </a:r>
             <a:r>
-              <a:rPr lang="zh-CN" altLang="en-US" sz="1200" b="1">
+              <a:rPr lang="zh-CN" altLang="en-US" sz="1200" b="1" dirty="0">
                 <a:solidFill>
                   <a:schemeClr val="tx1"/>
                 </a:solidFill>
@@ -4304,7 +4536,7 @@
               <a:buNone/>
             </a:pPr>
             <a:r>
-              <a:rPr lang="zh-CN" altLang="en-US" sz="1800">
+              <a:rPr lang="zh-CN" altLang="en-US" sz="1800" dirty="0">
                 <a:solidFill>
                   <a:srgbClr val="00B050"/>
                 </a:solidFill>
@@ -4313,7 +4545,7 @@
               <a:t>教师信息表（</a:t>
             </a:r>
             <a:r>
-              <a:rPr lang="en-US" altLang="zh-CN" sz="1800">
+              <a:rPr lang="en-US" altLang="zh-CN" sz="1800" dirty="0" err="1">
                 <a:solidFill>
                   <a:srgbClr val="00B050"/>
                 </a:solidFill>
@@ -4322,7 +4554,7 @@
               <a:t>teacher_information</a:t>
             </a:r>
             <a:r>
-              <a:rPr lang="zh-CN" altLang="en-US" sz="1800">
+              <a:rPr lang="zh-CN" altLang="en-US" sz="1800" dirty="0">
                 <a:solidFill>
                   <a:srgbClr val="00B050"/>
                 </a:solidFill>
@@ -4337,187 +4569,187 @@
               <a:buNone/>
             </a:pPr>
             <a:r>
-              <a:rPr lang="zh-CN" altLang="en-US" sz="1200" b="1">
+              <a:rPr lang="zh-CN" altLang="en-US" sz="1200" b="1" dirty="0">
                 <a:sym typeface="+mn-ea"/>
               </a:rPr>
               <a:t>唯一编号（</a:t>
             </a:r>
             <a:r>
-              <a:rPr lang="en-US" altLang="zh-CN" sz="1200" b="1">
+              <a:rPr lang="en-US" altLang="zh-CN" sz="1200" b="1" dirty="0">
                 <a:sym typeface="+mn-ea"/>
               </a:rPr>
               <a:t>uniqueClientID</a:t>
             </a:r>
             <a:r>
-              <a:rPr lang="zh-CN" altLang="en-US" sz="1200" b="1">
+              <a:rPr lang="zh-CN" altLang="en-US" sz="1200" b="1" dirty="0">
                 <a:sym typeface="+mn-ea"/>
               </a:rPr>
               <a:t>）、姓名（</a:t>
             </a:r>
             <a:r>
-              <a:rPr lang="en-US" altLang="zh-CN" sz="1200" b="1">
+              <a:rPr lang="en-US" altLang="zh-CN" sz="1200" b="1" dirty="0">
                 <a:sym typeface="+mn-ea"/>
               </a:rPr>
               <a:t>name</a:t>
             </a:r>
             <a:r>
-              <a:rPr lang="zh-CN" altLang="en-US" sz="1200" b="1">
+              <a:rPr lang="zh-CN" altLang="en-US" sz="1200" b="1" dirty="0">
                 <a:sym typeface="+mn-ea"/>
               </a:rPr>
               <a:t>）、性别（</a:t>
             </a:r>
             <a:r>
-              <a:rPr lang="en-US" altLang="zh-CN" sz="1200" b="1">
+              <a:rPr lang="en-US" altLang="zh-CN" sz="1200" b="1" dirty="0">
                 <a:sym typeface="+mn-ea"/>
               </a:rPr>
               <a:t>gender</a:t>
             </a:r>
             <a:r>
-              <a:rPr lang="zh-CN" altLang="en-US" sz="1200" b="1">
+              <a:rPr lang="zh-CN" altLang="en-US" sz="1200" b="1" dirty="0">
                 <a:sym typeface="+mn-ea"/>
               </a:rPr>
               <a:t>）、年龄（</a:t>
             </a:r>
             <a:r>
-              <a:rPr lang="en-US" altLang="zh-CN" sz="1200" b="1">
+              <a:rPr lang="en-US" altLang="zh-CN" sz="1200" b="1" dirty="0">
                 <a:sym typeface="+mn-ea"/>
               </a:rPr>
               <a:t>age</a:t>
             </a:r>
             <a:r>
-              <a:rPr lang="zh-CN" altLang="en-US" sz="1200" b="1">
+              <a:rPr lang="zh-CN" altLang="en-US" sz="1200" b="1" dirty="0">
                 <a:sym typeface="+mn-ea"/>
               </a:rPr>
               <a:t>）、邮箱（</a:t>
             </a:r>
             <a:r>
-              <a:rPr lang="en-US" altLang="zh-CN" sz="1200" b="1">
+              <a:rPr lang="en-US" altLang="zh-CN" sz="1200" b="1" dirty="0">
                 <a:sym typeface="+mn-ea"/>
               </a:rPr>
               <a:t>email</a:t>
             </a:r>
             <a:r>
-              <a:rPr lang="zh-CN" altLang="en-US" sz="1200" b="1">
+              <a:rPr lang="zh-CN" altLang="en-US" sz="1200" b="1" dirty="0">
                 <a:sym typeface="+mn-ea"/>
               </a:rPr>
               <a:t>）、微信（</a:t>
             </a:r>
             <a:r>
-              <a:rPr lang="en-US" altLang="zh-CN" sz="1200" b="1">
+              <a:rPr lang="en-US" altLang="zh-CN" sz="1200" b="1" dirty="0">
                 <a:sym typeface="+mn-ea"/>
               </a:rPr>
               <a:t>wechat</a:t>
             </a:r>
             <a:r>
-              <a:rPr lang="zh-CN" altLang="en-US" sz="1200" b="1">
+              <a:rPr lang="zh-CN" altLang="en-US" sz="1200" b="1" dirty="0">
                 <a:sym typeface="+mn-ea"/>
               </a:rPr>
               <a:t>）、</a:t>
             </a:r>
             <a:r>
-              <a:rPr lang="en-US" altLang="zh-CN" sz="1200" b="1">
+              <a:rPr lang="en-US" altLang="zh-CN" sz="1200" b="1" dirty="0">
                 <a:sym typeface="+mn-ea"/>
               </a:rPr>
               <a:t>QQ</a:t>
             </a:r>
             <a:r>
-              <a:rPr lang="zh-CN" altLang="en-US" sz="1200" b="1">
+              <a:rPr lang="zh-CN" altLang="en-US" sz="1200" b="1" dirty="0">
                 <a:sym typeface="+mn-ea"/>
               </a:rPr>
               <a:t>号（</a:t>
             </a:r>
             <a:r>
-              <a:rPr lang="en-US" altLang="zh-CN" sz="1200" b="1">
+              <a:rPr lang="en-US" altLang="zh-CN" sz="1200" b="1" dirty="0" err="1">
                 <a:sym typeface="+mn-ea"/>
               </a:rPr>
               <a:t>qqNumber</a:t>
             </a:r>
             <a:r>
-              <a:rPr lang="zh-CN" altLang="en-US" sz="1200" b="1">
+              <a:rPr lang="zh-CN" altLang="en-US" sz="1200" b="1" dirty="0">
                 <a:sym typeface="+mn-ea"/>
               </a:rPr>
               <a:t>）、手机号（</a:t>
             </a:r>
             <a:r>
-              <a:rPr lang="en-US" altLang="zh-CN" sz="1200" b="1">
+              <a:rPr lang="en-US" altLang="zh-CN" sz="1200" b="1" dirty="0">
                 <a:sym typeface="+mn-ea"/>
               </a:rPr>
               <a:t>phone</a:t>
             </a:r>
             <a:r>
-              <a:rPr lang="zh-CN" altLang="en-US" sz="1200" b="1">
+              <a:rPr lang="zh-CN" altLang="en-US" sz="1200" b="1" dirty="0">
                 <a:sym typeface="+mn-ea"/>
               </a:rPr>
               <a:t>）、学校（</a:t>
             </a:r>
             <a:r>
-              <a:rPr lang="en-US" altLang="zh-CN" sz="1200" b="1">
+              <a:rPr lang="en-US" altLang="zh-CN" sz="1200" b="1" dirty="0">
                 <a:sym typeface="+mn-ea"/>
               </a:rPr>
               <a:t>university</a:t>
             </a:r>
             <a:r>
-              <a:rPr lang="zh-CN" altLang="en-US" sz="1200" b="1">
+              <a:rPr lang="zh-CN" altLang="en-US" sz="1200" b="1" dirty="0">
                 <a:sym typeface="+mn-ea"/>
               </a:rPr>
               <a:t>）、学院（</a:t>
             </a:r>
             <a:r>
-              <a:rPr lang="en-US" altLang="zh-CN" sz="1200" b="1">
+              <a:rPr lang="en-US" altLang="zh-CN" sz="1200" b="1" dirty="0">
                 <a:sym typeface="+mn-ea"/>
               </a:rPr>
               <a:t>college</a:t>
             </a:r>
             <a:r>
-              <a:rPr lang="zh-CN" altLang="en-US" sz="1200" b="1">
+              <a:rPr lang="zh-CN" altLang="en-US" sz="1200" b="1" dirty="0">
                 <a:sym typeface="+mn-ea"/>
               </a:rPr>
               <a:t>）、专业（</a:t>
             </a:r>
             <a:r>
-              <a:rPr lang="en-US" altLang="zh-CN" sz="1200" b="1">
+              <a:rPr lang="en-US" altLang="zh-CN" sz="1200" b="1" dirty="0">
                 <a:sym typeface="+mn-ea"/>
               </a:rPr>
               <a:t>major</a:t>
             </a:r>
             <a:r>
-              <a:rPr lang="zh-CN" altLang="en-US" sz="1200" b="1">
+              <a:rPr lang="zh-CN" altLang="en-US" sz="1200" b="1" dirty="0">
                 <a:sym typeface="+mn-ea"/>
               </a:rPr>
               <a:t>）、所授课程（</a:t>
             </a:r>
             <a:r>
-              <a:rPr lang="en-US" altLang="zh-CN" sz="1200" b="1">
+              <a:rPr lang="en-US" altLang="zh-CN" sz="1200" b="1" dirty="0">
                 <a:sym typeface="+mn-ea"/>
               </a:rPr>
               <a:t>courses</a:t>
             </a:r>
             <a:r>
-              <a:rPr lang="zh-CN" altLang="en-US" sz="1200" b="1">
+              <a:rPr lang="zh-CN" altLang="en-US" sz="1200" b="1" dirty="0">
                 <a:sym typeface="+mn-ea"/>
               </a:rPr>
               <a:t>）、教工号（</a:t>
             </a:r>
             <a:r>
-              <a:rPr lang="en-US" altLang="zh-CN" sz="1200" b="1">
+              <a:rPr lang="en-US" altLang="zh-CN" sz="1200" b="1" dirty="0" err="1">
                 <a:sym typeface="+mn-ea"/>
               </a:rPr>
               <a:t>workNo</a:t>
             </a:r>
             <a:r>
-              <a:rPr lang="zh-CN" altLang="en-US" sz="1200" b="1">
+              <a:rPr lang="zh-CN" altLang="en-US" sz="1200" b="1" dirty="0">
                 <a:sym typeface="+mn-ea"/>
               </a:rPr>
               <a:t>）、教工密码（</a:t>
             </a:r>
             <a:r>
-              <a:rPr lang="en-US" altLang="zh-CN" sz="1200" b="1">
+              <a:rPr lang="en-US" altLang="zh-CN" sz="1200" b="1" dirty="0" err="1">
                 <a:sym typeface="+mn-ea"/>
               </a:rPr>
               <a:t>workPass</a:t>
             </a:r>
             <a:r>
-              <a:rPr lang="zh-CN" altLang="en-US" sz="1200" b="1">
+              <a:rPr lang="zh-CN" altLang="en-US" sz="1200" b="1" dirty="0">
                 <a:sym typeface="+mn-ea"/>
               </a:rPr>
               <a:t>）</a:t>
@@ -5741,7 +5973,7 @@
           <a:p>
             <a:r>
               <a:rPr lang="zh-CN" altLang="en-US"/>
-              <a:t>评价（数据库模块）</a:t>
+              <a:t>规则（数据库模块）</a:t>
             </a:r>
           </a:p>
         </p:txBody>
@@ -5762,8 +5994,214 @@
           <a:lstStyle/>
           <a:p>
             <a:r>
-              <a:rPr lang="zh-CN" altLang="en-US"/>
-              <a:t>学生</a:t>
+              <a:rPr lang="zh-CN" altLang="en-US" dirty="0"/>
+              <a:t>对于所有的课程，其类别对应于</a:t>
+            </a:r>
+            <a:r>
+              <a:rPr lang="en-US" altLang="zh-CN" dirty="0" err="1"/>
+              <a:t>courseID</a:t>
+            </a:r>
+            <a:r>
+              <a:rPr lang="zh-CN" altLang="en-US" dirty="0"/>
+              <a:t>中的前两个字符（</a:t>
+            </a:r>
+            <a:r>
+              <a:rPr lang="zh-CN" altLang="en-US" sz="2400" dirty="0"/>
+              <a:t>例如：我国的十三个学科门类：哲学</a:t>
+            </a:r>
+            <a:r>
+              <a:rPr lang="en-US" altLang="zh-CN" sz="2400" dirty="0"/>
+              <a:t>CA</a:t>
+            </a:r>
+            <a:r>
+              <a:rPr lang="zh-CN" altLang="en-US" sz="2400" dirty="0"/>
+              <a:t>、经济学</a:t>
+            </a:r>
+            <a:r>
+              <a:rPr lang="en-US" altLang="zh-CN" sz="2400" dirty="0"/>
+              <a:t>CB</a:t>
+            </a:r>
+            <a:r>
+              <a:rPr lang="zh-CN" altLang="en-US" sz="2400" dirty="0"/>
+              <a:t>、法学</a:t>
+            </a:r>
+            <a:r>
+              <a:rPr lang="en-US" altLang="zh-CN" sz="2400" dirty="0"/>
+              <a:t>CC</a:t>
+            </a:r>
+            <a:r>
+              <a:rPr lang="zh-CN" altLang="en-US" sz="2400" dirty="0"/>
+              <a:t>、教育学</a:t>
+            </a:r>
+            <a:r>
+              <a:rPr lang="en-US" altLang="zh-CN" sz="2400" dirty="0"/>
+              <a:t>CD</a:t>
+            </a:r>
+            <a:r>
+              <a:rPr lang="zh-CN" altLang="en-US" sz="2400" dirty="0"/>
+              <a:t>、文学</a:t>
+            </a:r>
+            <a:r>
+              <a:rPr lang="en-US" altLang="zh-CN" sz="2400" dirty="0"/>
+              <a:t>CE</a:t>
+            </a:r>
+            <a:r>
+              <a:rPr lang="zh-CN" altLang="en-US" sz="2400" dirty="0"/>
+              <a:t>、历史学</a:t>
+            </a:r>
+            <a:r>
+              <a:rPr lang="en-US" altLang="zh-CN" sz="2400" dirty="0"/>
+              <a:t>CF</a:t>
+            </a:r>
+            <a:r>
+              <a:rPr lang="zh-CN" altLang="en-US" sz="2400" dirty="0"/>
+              <a:t>、理学</a:t>
+            </a:r>
+            <a:r>
+              <a:rPr lang="en-US" altLang="zh-CN" sz="2400" dirty="0"/>
+              <a:t>CG</a:t>
+            </a:r>
+            <a:r>
+              <a:rPr lang="zh-CN" altLang="en-US" sz="2400" dirty="0"/>
+              <a:t>、工学</a:t>
+            </a:r>
+            <a:r>
+              <a:rPr lang="en-US" altLang="zh-CN" sz="2400" dirty="0"/>
+              <a:t>CH</a:t>
+            </a:r>
+            <a:r>
+              <a:rPr lang="zh-CN" altLang="en-US" sz="2400" dirty="0"/>
+              <a:t>、农学</a:t>
+            </a:r>
+            <a:r>
+              <a:rPr lang="en-US" altLang="zh-CN" sz="2400" dirty="0"/>
+              <a:t>CI</a:t>
+            </a:r>
+            <a:r>
+              <a:rPr lang="zh-CN" altLang="en-US" sz="2400" dirty="0"/>
+              <a:t>、医学</a:t>
+            </a:r>
+            <a:r>
+              <a:rPr lang="en-US" altLang="zh-CN" sz="2400" dirty="0"/>
+              <a:t>CJ</a:t>
+            </a:r>
+            <a:r>
+              <a:rPr lang="zh-CN" altLang="en-US" sz="2400" dirty="0"/>
+              <a:t>、军事学</a:t>
+            </a:r>
+            <a:r>
+              <a:rPr lang="en-US" altLang="zh-CN" sz="2400" dirty="0"/>
+              <a:t>K</a:t>
+            </a:r>
+            <a:r>
+              <a:rPr lang="zh-CN" altLang="en-US" sz="2400" dirty="0"/>
+              <a:t>、管理学</a:t>
+            </a:r>
+            <a:r>
+              <a:rPr lang="en-US" altLang="zh-CN" sz="2400" dirty="0"/>
+              <a:t>CL</a:t>
+            </a:r>
+            <a:r>
+              <a:rPr lang="zh-CN" altLang="en-US" sz="2400" dirty="0"/>
+              <a:t>、艺术学</a:t>
+            </a:r>
+            <a:r>
+              <a:rPr lang="en-US" altLang="zh-CN" sz="2400" dirty="0"/>
+              <a:t>CM</a:t>
+            </a:r>
+            <a:r>
+              <a:rPr lang="zh-CN" altLang="en-US" sz="2400" dirty="0"/>
+              <a:t>；字母代表</a:t>
+            </a:r>
+            <a:r>
+              <a:rPr lang="en-US" altLang="zh-CN" sz="2400" dirty="0" err="1"/>
+              <a:t>courseID</a:t>
+            </a:r>
+            <a:r>
+              <a:rPr lang="zh-CN" altLang="en-US" sz="2400" dirty="0"/>
+              <a:t>中的第一个字符，例如课程《数据库原理》</a:t>
+            </a:r>
+            <a:r>
+              <a:rPr lang="en-US" altLang="zh-CN" sz="2400" dirty="0" err="1"/>
+              <a:t>courseID</a:t>
+            </a:r>
+            <a:r>
+              <a:rPr lang="zh-CN" altLang="en-US" sz="2400" dirty="0"/>
+              <a:t>为：</a:t>
+            </a:r>
+            <a:r>
+              <a:rPr lang="en-US" altLang="zh-CN" sz="2400" dirty="0"/>
+              <a:t>CHXX000001</a:t>
+            </a:r>
+            <a:r>
+              <a:rPr lang="zh-CN" altLang="en-US" dirty="0"/>
+              <a:t>）。</a:t>
+            </a:r>
+          </a:p>
+          <a:p>
+            <a:r>
+              <a:rPr lang="zh-CN" altLang="en-US" dirty="0"/>
+              <a:t>编号（</a:t>
+            </a:r>
+            <a:r>
+              <a:rPr lang="en-US" altLang="zh-CN" dirty="0" err="1"/>
+              <a:t>uniqueClientID</a:t>
+            </a:r>
+            <a:r>
+              <a:rPr lang="zh-CN" altLang="en-US" dirty="0"/>
+              <a:t>）的唯一性：该环境下假设总用户数量不超过</a:t>
+            </a:r>
+            <a:r>
+              <a:rPr lang="en-US" altLang="zh-CN" dirty="0"/>
+              <a:t>1</a:t>
+            </a:r>
+            <a:r>
+              <a:rPr lang="zh-CN" altLang="en-US" dirty="0"/>
+              <a:t>亿（则编号从</a:t>
+            </a:r>
+            <a:r>
+              <a:rPr lang="en-US" altLang="zh-CN" dirty="0"/>
+              <a:t>U</a:t>
+            </a:r>
+            <a:r>
+              <a:rPr lang="en-US" altLang="zh-CN" dirty="0">
+                <a:solidFill>
+                  <a:schemeClr val="accent6">
+                    <a:lumMod val="50000"/>
+                  </a:schemeClr>
+                </a:solidFill>
+              </a:rPr>
+              <a:t>X</a:t>
+            </a:r>
+            <a:r>
+              <a:rPr lang="en-US" altLang="zh-CN" dirty="0"/>
+              <a:t>00000000</a:t>
+            </a:r>
+            <a:r>
+              <a:rPr lang="zh-CN" altLang="en-US" dirty="0"/>
+              <a:t>到</a:t>
+            </a:r>
+            <a:r>
+              <a:rPr lang="en-US" altLang="zh-CN" dirty="0"/>
+              <a:t>U</a:t>
+            </a:r>
+            <a:r>
+              <a:rPr lang="en-US" altLang="zh-CN" dirty="0">
+                <a:solidFill>
+                  <a:schemeClr val="accent6">
+                    <a:lumMod val="50000"/>
+                  </a:schemeClr>
+                </a:solidFill>
+              </a:rPr>
+              <a:t>X</a:t>
+            </a:r>
+            <a:r>
+              <a:rPr lang="en-US" altLang="zh-CN" dirty="0"/>
+              <a:t>99999999</a:t>
+            </a:r>
+            <a:r>
+              <a:rPr lang="zh-CN" altLang="en-US" dirty="0"/>
+              <a:t>）</a:t>
             </a:r>
           </a:p>
         </p:txBody>
@@ -5803,20 +6241,16 @@
             <p:ph type="title"/>
           </p:nvPr>
         </p:nvSpPr>
-        <p:spPr>
-          <a:xfrm>
-            <a:off x="838200" y="277495"/>
-            <a:ext cx="10515600" cy="1325563"/>
-          </a:xfrm>
-        </p:spPr>
-        <p:txBody>
-          <a:bodyPr/>
-          <a:lstStyle/>
-          <a:p>
-            <a:r>
-              <a:rPr lang="zh-CN" altLang="en-US"/>
-              <a:t>规则（数据库模块）</a:t>
-            </a:r>
+        <p:spPr/>
+        <p:txBody>
+          <a:bodyPr/>
+          <a:lstStyle/>
+          <a:p>
+            <a:r>
+              <a:rPr lang="zh-CN" altLang="en-US"/>
+              <a:t>功能设计</a:t>
+            </a:r>
+            <a:endParaRPr lang="en-US" altLang="zh-CN"/>
           </a:p>
         </p:txBody>
       </p:sp>
@@ -5836,214 +6270,8 @@
           <a:lstStyle/>
           <a:p>
             <a:r>
-              <a:rPr lang="zh-CN" altLang="en-US" dirty="0"/>
-              <a:t>对于所有的课程，其类别对应于</a:t>
-            </a:r>
-            <a:r>
-              <a:rPr lang="en-US" altLang="zh-CN" dirty="0" err="1"/>
-              <a:t>courseID</a:t>
-            </a:r>
-            <a:r>
-              <a:rPr lang="zh-CN" altLang="en-US" dirty="0"/>
-              <a:t>中的前两个字符（</a:t>
-            </a:r>
-            <a:r>
-              <a:rPr lang="zh-CN" altLang="en-US" sz="2400" dirty="0"/>
-              <a:t>例如：我国的十三个学科门类：哲学</a:t>
-            </a:r>
-            <a:r>
-              <a:rPr lang="en-US" altLang="zh-CN" sz="2400" dirty="0"/>
-              <a:t>CA</a:t>
-            </a:r>
-            <a:r>
-              <a:rPr lang="zh-CN" altLang="en-US" sz="2400" dirty="0"/>
-              <a:t>、经济学</a:t>
-            </a:r>
-            <a:r>
-              <a:rPr lang="en-US" altLang="zh-CN" sz="2400" dirty="0"/>
-              <a:t>CB</a:t>
-            </a:r>
-            <a:r>
-              <a:rPr lang="zh-CN" altLang="en-US" sz="2400" dirty="0"/>
-              <a:t>、法学</a:t>
-            </a:r>
-            <a:r>
-              <a:rPr lang="en-US" altLang="zh-CN" sz="2400" dirty="0"/>
-              <a:t>CC</a:t>
-            </a:r>
-            <a:r>
-              <a:rPr lang="zh-CN" altLang="en-US" sz="2400" dirty="0"/>
-              <a:t>、教育学</a:t>
-            </a:r>
-            <a:r>
-              <a:rPr lang="en-US" altLang="zh-CN" sz="2400" dirty="0"/>
-              <a:t>CD</a:t>
-            </a:r>
-            <a:r>
-              <a:rPr lang="zh-CN" altLang="en-US" sz="2400" dirty="0"/>
-              <a:t>、文学</a:t>
-            </a:r>
-            <a:r>
-              <a:rPr lang="en-US" altLang="zh-CN" sz="2400" dirty="0"/>
-              <a:t>CE</a:t>
-            </a:r>
-            <a:r>
-              <a:rPr lang="zh-CN" altLang="en-US" sz="2400" dirty="0"/>
-              <a:t>、历史学</a:t>
-            </a:r>
-            <a:r>
-              <a:rPr lang="en-US" altLang="zh-CN" sz="2400" dirty="0"/>
-              <a:t>CF</a:t>
-            </a:r>
-            <a:r>
-              <a:rPr lang="zh-CN" altLang="en-US" sz="2400" dirty="0"/>
-              <a:t>、理学</a:t>
-            </a:r>
-            <a:r>
-              <a:rPr lang="en-US" altLang="zh-CN" sz="2400" dirty="0"/>
-              <a:t>CG</a:t>
-            </a:r>
-            <a:r>
-              <a:rPr lang="zh-CN" altLang="en-US" sz="2400" dirty="0"/>
-              <a:t>、工学</a:t>
-            </a:r>
-            <a:r>
-              <a:rPr lang="en-US" altLang="zh-CN" sz="2400" dirty="0"/>
-              <a:t>CH</a:t>
-            </a:r>
-            <a:r>
-              <a:rPr lang="zh-CN" altLang="en-US" sz="2400" dirty="0"/>
-              <a:t>、农学</a:t>
-            </a:r>
-            <a:r>
-              <a:rPr lang="en-US" altLang="zh-CN" sz="2400" dirty="0"/>
-              <a:t>CI</a:t>
-            </a:r>
-            <a:r>
-              <a:rPr lang="zh-CN" altLang="en-US" sz="2400" dirty="0"/>
-              <a:t>、医学</a:t>
-            </a:r>
-            <a:r>
-              <a:rPr lang="en-US" altLang="zh-CN" sz="2400" dirty="0"/>
-              <a:t>CJ</a:t>
-            </a:r>
-            <a:r>
-              <a:rPr lang="zh-CN" altLang="en-US" sz="2400" dirty="0"/>
-              <a:t>、军事学</a:t>
-            </a:r>
-            <a:r>
-              <a:rPr lang="en-US" altLang="zh-CN" sz="2400" dirty="0"/>
-              <a:t>K</a:t>
-            </a:r>
-            <a:r>
-              <a:rPr lang="zh-CN" altLang="en-US" sz="2400" dirty="0"/>
-              <a:t>、管理学</a:t>
-            </a:r>
-            <a:r>
-              <a:rPr lang="en-US" altLang="zh-CN" sz="2400" dirty="0"/>
-              <a:t>CL</a:t>
-            </a:r>
-            <a:r>
-              <a:rPr lang="zh-CN" altLang="en-US" sz="2400" dirty="0"/>
-              <a:t>、艺术学</a:t>
-            </a:r>
-            <a:r>
-              <a:rPr lang="en-US" altLang="zh-CN" sz="2400" dirty="0"/>
-              <a:t>CM</a:t>
-            </a:r>
-            <a:r>
-              <a:rPr lang="zh-CN" altLang="en-US" sz="2400" dirty="0"/>
-              <a:t>；字母代表</a:t>
-            </a:r>
-            <a:r>
-              <a:rPr lang="en-US" altLang="zh-CN" sz="2400" dirty="0" err="1"/>
-              <a:t>courseID</a:t>
-            </a:r>
-            <a:r>
-              <a:rPr lang="zh-CN" altLang="en-US" sz="2400" dirty="0"/>
-              <a:t>中的第一个字符，例如课程《数据库原理》</a:t>
-            </a:r>
-            <a:r>
-              <a:rPr lang="en-US" altLang="zh-CN" sz="2400" dirty="0" err="1"/>
-              <a:t>courseID</a:t>
-            </a:r>
-            <a:r>
-              <a:rPr lang="zh-CN" altLang="en-US" sz="2400" dirty="0"/>
-              <a:t>为：</a:t>
-            </a:r>
-            <a:r>
-              <a:rPr lang="en-US" altLang="zh-CN" sz="2400" dirty="0"/>
-              <a:t>CHXX000001</a:t>
-            </a:r>
-            <a:r>
-              <a:rPr lang="zh-CN" altLang="en-US" dirty="0"/>
-              <a:t>）。</a:t>
-            </a:r>
-          </a:p>
-          <a:p>
-            <a:r>
-              <a:rPr lang="zh-CN" altLang="en-US" dirty="0"/>
-              <a:t>编号（</a:t>
-            </a:r>
-            <a:r>
-              <a:rPr lang="en-US" altLang="zh-CN" dirty="0" err="1"/>
-              <a:t>uniqueClientID</a:t>
-            </a:r>
-            <a:r>
-              <a:rPr lang="zh-CN" altLang="en-US" dirty="0"/>
-              <a:t>）的唯一性：该环境下假设总用户数量不超过</a:t>
-            </a:r>
-            <a:r>
-              <a:rPr lang="en-US" altLang="zh-CN" dirty="0"/>
-              <a:t>1</a:t>
-            </a:r>
-            <a:r>
-              <a:rPr lang="zh-CN" altLang="en-US" dirty="0"/>
-              <a:t>亿（则编号从</a:t>
-            </a:r>
-            <a:r>
-              <a:rPr lang="en-US" altLang="zh-CN" dirty="0"/>
-              <a:t>U</a:t>
-            </a:r>
-            <a:r>
-              <a:rPr lang="en-US" altLang="zh-CN" dirty="0">
-                <a:solidFill>
-                  <a:schemeClr val="accent6">
-                    <a:lumMod val="50000"/>
-                  </a:schemeClr>
-                </a:solidFill>
-              </a:rPr>
-              <a:t>X</a:t>
-            </a:r>
-            <a:r>
-              <a:rPr lang="en-US" altLang="zh-CN" dirty="0"/>
-              <a:t>00000000</a:t>
-            </a:r>
-            <a:r>
-              <a:rPr lang="zh-CN" altLang="en-US" dirty="0"/>
-              <a:t>到</a:t>
-            </a:r>
-            <a:r>
-              <a:rPr lang="en-US" altLang="zh-CN" dirty="0"/>
-              <a:t>U</a:t>
-            </a:r>
-            <a:r>
-              <a:rPr lang="en-US" altLang="zh-CN" dirty="0">
-                <a:solidFill>
-                  <a:schemeClr val="accent6">
-                    <a:lumMod val="50000"/>
-                  </a:schemeClr>
-                </a:solidFill>
-              </a:rPr>
-              <a:t>X</a:t>
-            </a:r>
-            <a:r>
-              <a:rPr lang="en-US" altLang="zh-CN" dirty="0"/>
-              <a:t>99999999</a:t>
-            </a:r>
-            <a:r>
-              <a:rPr lang="zh-CN" altLang="en-US" dirty="0"/>
-              <a:t>）</a:t>
+              <a:rPr lang="zh-CN" altLang="en-US"/>
+              <a:t>用户注册之后即可登录。登陆之后可以查看课表，如果没有课表，可以进行选课，选课完成之后可以进行查看，课程结束之后可以评价。查看教师，查看课程。</a:t>
             </a:r>
           </a:p>
         </p:txBody>
@@ -6088,11 +6316,7 @@
           <a:bodyPr/>
           <a:lstStyle/>
           <a:p>
-            <a:r>
-              <a:rPr lang="zh-CN" altLang="en-US"/>
-              <a:t>功能设计</a:t>
-            </a:r>
-            <a:endParaRPr lang="en-US" altLang="zh-CN"/>
+            <a:endParaRPr lang="zh-CN" altLang="en-US" dirty="0"/>
           </a:p>
         </p:txBody>
       </p:sp>
@@ -6112,9 +6336,22 @@
           <a:lstStyle/>
           <a:p>
             <a:r>
-              <a:rPr lang="zh-CN" altLang="en-US"/>
-              <a:t>用户注册之后即可登录。登陆之后可以查看课表，如果没有课表，可以进行选课，选课完成之后可以进行查看，课程结束之后可以评价。查看教师，查看课程。</a:t>
-            </a:r>
+              <a:rPr lang="zh-CN" altLang="en-US" dirty="0"/>
+              <a:t>占位</a:t>
+            </a:r>
+          </a:p>
+          <a:p>
+            <a:r>
+              <a:rPr lang="zh-CN" altLang="en-US" dirty="0"/>
+              <a:t>占位：</a:t>
+            </a:r>
+            <a:r>
+              <a:rPr lang="zh-CN" altLang="en-US" dirty="0">
+                <a:hlinkClick r:id="rId2" action="ppaction://hlinkfile"/>
+              </a:rPr>
+              <a:t>学生选课系统数据库设计</a:t>
+            </a:r>
+            <a:endParaRPr lang="zh-CN" altLang="en-US" dirty="0"/>
           </a:p>
         </p:txBody>
       </p:sp>

</xml_diff>